<commit_message>
Change architektur image in presentation
</commit_message>
<xml_diff>
--- a/Zwischenvortrag/Zwischenpraesentation.pptx
+++ b/Zwischenvortrag/Zwischenpraesentation.pptx
@@ -120,7 +120,18 @@
   </p:defaultTextStyle>
   <p:extLst>
     <p:ext uri="{EFAFB233-063F-42B5-8137-9DF3F51BA10A}">
-      <p15:sldGuideLst xmlns="" xmlns:p15="http://schemas.microsoft.com/office/powerpoint/2012/main"/>
+      <p15:sldGuideLst xmlns:p15="http://schemas.microsoft.com/office/powerpoint/2012/main">
+        <p15:guide id="1" orient="horz" pos="2160">
+          <p15:clr>
+            <a:srgbClr val="A4A3A4"/>
+          </p15:clr>
+        </p15:guide>
+        <p15:guide id="2" pos="3840">
+          <p15:clr>
+            <a:srgbClr val="A4A3A4"/>
+          </p15:clr>
+        </p15:guide>
+      </p15:sldGuideLst>
     </p:ext>
   </p:extLst>
 </p:presentation>
@@ -208,7 +219,7 @@
           <a:p>
             <a:fld id="{683D44F8-09BE-4E2C-8664-003F66647BE5}" type="datetimeFigureOut">
               <a:rPr lang="de-DE"/>
-              <a:t>20.09.2017</a:t>
+              <a:t>20.09.17</a:t>
             </a:fld>
             <a:endParaRPr lang="de-DE"/>
           </a:p>
@@ -366,7 +377,7 @@
           <a:p>
             <a:fld id="{70C89F93-C877-43F9-9B16-5344F31BB83F}" type="slidenum">
               <a:rPr lang="de-DE"/>
-              <a:t>‹Nr.›</a:t>
+              <a:t>‹#›</a:t>
             </a:fld>
             <a:endParaRPr lang="de-DE"/>
           </a:p>
@@ -1674,7 +1685,7 @@
           <a:p>
             <a:fld id="{D3EB3054-B75A-4BD7-8B3E-8DC0F614FAF3}" type="datetimeFigureOut">
               <a:rPr lang="de-DE" smtClean="0"/>
-              <a:t>20.09.2017</a:t>
+              <a:t>20.09.17</a:t>
             </a:fld>
             <a:endParaRPr lang="de-DE"/>
           </a:p>
@@ -1716,7 +1727,7 @@
           <a:p>
             <a:fld id="{802006FE-6571-4354-8775-F8708372C227}" type="slidenum">
               <a:rPr lang="de-DE" smtClean="0"/>
-              <a:t>‹Nr.›</a:t>
+              <a:t>‹#›</a:t>
             </a:fld>
             <a:endParaRPr lang="de-DE"/>
           </a:p>
@@ -1842,7 +1853,7 @@
           <a:p>
             <a:fld id="{D3EB3054-B75A-4BD7-8B3E-8DC0F614FAF3}" type="datetimeFigureOut">
               <a:rPr lang="de-DE" smtClean="0"/>
-              <a:t>20.09.2017</a:t>
+              <a:t>20.09.17</a:t>
             </a:fld>
             <a:endParaRPr lang="de-DE"/>
           </a:p>
@@ -1884,7 +1895,7 @@
           <a:p>
             <a:fld id="{802006FE-6571-4354-8775-F8708372C227}" type="slidenum">
               <a:rPr lang="de-DE" smtClean="0"/>
-              <a:t>‹Nr.›</a:t>
+              <a:t>‹#›</a:t>
             </a:fld>
             <a:endParaRPr lang="de-DE"/>
           </a:p>
@@ -2020,7 +2031,7 @@
           <a:p>
             <a:fld id="{D3EB3054-B75A-4BD7-8B3E-8DC0F614FAF3}" type="datetimeFigureOut">
               <a:rPr lang="de-DE" smtClean="0"/>
-              <a:t>20.09.2017</a:t>
+              <a:t>20.09.17</a:t>
             </a:fld>
             <a:endParaRPr lang="de-DE"/>
           </a:p>
@@ -2062,7 +2073,7 @@
           <a:p>
             <a:fld id="{802006FE-6571-4354-8775-F8708372C227}" type="slidenum">
               <a:rPr lang="de-DE" smtClean="0"/>
-              <a:t>‹Nr.›</a:t>
+              <a:t>‹#›</a:t>
             </a:fld>
             <a:endParaRPr lang="de-DE"/>
           </a:p>
@@ -2188,7 +2199,7 @@
           <a:p>
             <a:fld id="{D3EB3054-B75A-4BD7-8B3E-8DC0F614FAF3}" type="datetimeFigureOut">
               <a:rPr lang="de-DE" smtClean="0"/>
-              <a:t>20.09.2017</a:t>
+              <a:t>20.09.17</a:t>
             </a:fld>
             <a:endParaRPr lang="de-DE"/>
           </a:p>
@@ -2230,7 +2241,7 @@
           <a:p>
             <a:fld id="{802006FE-6571-4354-8775-F8708372C227}" type="slidenum">
               <a:rPr lang="de-DE" smtClean="0"/>
-              <a:t>‹Nr.›</a:t>
+              <a:t>‹#›</a:t>
             </a:fld>
             <a:endParaRPr lang="de-DE"/>
           </a:p>
@@ -2433,7 +2444,7 @@
           <a:p>
             <a:fld id="{D3EB3054-B75A-4BD7-8B3E-8DC0F614FAF3}" type="datetimeFigureOut">
               <a:rPr lang="de-DE" smtClean="0"/>
-              <a:t>20.09.2017</a:t>
+              <a:t>20.09.17</a:t>
             </a:fld>
             <a:endParaRPr lang="de-DE"/>
           </a:p>
@@ -2475,7 +2486,7 @@
           <a:p>
             <a:fld id="{802006FE-6571-4354-8775-F8708372C227}" type="slidenum">
               <a:rPr lang="de-DE" smtClean="0"/>
-              <a:t>‹Nr.›</a:t>
+              <a:t>‹#›</a:t>
             </a:fld>
             <a:endParaRPr lang="de-DE"/>
           </a:p>
@@ -2662,7 +2673,7 @@
           <a:p>
             <a:fld id="{D3EB3054-B75A-4BD7-8B3E-8DC0F614FAF3}" type="datetimeFigureOut">
               <a:rPr lang="de-DE" smtClean="0"/>
-              <a:t>20.09.2017</a:t>
+              <a:t>20.09.17</a:t>
             </a:fld>
             <a:endParaRPr lang="de-DE"/>
           </a:p>
@@ -2704,7 +2715,7 @@
           <a:p>
             <a:fld id="{802006FE-6571-4354-8775-F8708372C227}" type="slidenum">
               <a:rPr lang="de-DE" smtClean="0"/>
-              <a:t>‹Nr.›</a:t>
+              <a:t>‹#›</a:t>
             </a:fld>
             <a:endParaRPr lang="de-DE"/>
           </a:p>
@@ -3026,7 +3037,7 @@
           <a:p>
             <a:fld id="{D3EB3054-B75A-4BD7-8B3E-8DC0F614FAF3}" type="datetimeFigureOut">
               <a:rPr lang="de-DE" smtClean="0"/>
-              <a:t>20.09.2017</a:t>
+              <a:t>20.09.17</a:t>
             </a:fld>
             <a:endParaRPr lang="de-DE"/>
           </a:p>
@@ -3068,7 +3079,7 @@
           <a:p>
             <a:fld id="{802006FE-6571-4354-8775-F8708372C227}" type="slidenum">
               <a:rPr lang="de-DE" smtClean="0"/>
-              <a:t>‹Nr.›</a:t>
+              <a:t>‹#›</a:t>
             </a:fld>
             <a:endParaRPr lang="de-DE"/>
           </a:p>
@@ -3143,7 +3154,7 @@
           <a:p>
             <a:fld id="{D3EB3054-B75A-4BD7-8B3E-8DC0F614FAF3}" type="datetimeFigureOut">
               <a:rPr lang="de-DE" smtClean="0"/>
-              <a:t>20.09.2017</a:t>
+              <a:t>20.09.17</a:t>
             </a:fld>
             <a:endParaRPr lang="de-DE"/>
           </a:p>
@@ -3185,7 +3196,7 @@
           <a:p>
             <a:fld id="{802006FE-6571-4354-8775-F8708372C227}" type="slidenum">
               <a:rPr lang="de-DE" smtClean="0"/>
-              <a:t>‹Nr.›</a:t>
+              <a:t>‹#›</a:t>
             </a:fld>
             <a:endParaRPr lang="de-DE"/>
           </a:p>
@@ -3238,7 +3249,7 @@
           <a:p>
             <a:fld id="{D3EB3054-B75A-4BD7-8B3E-8DC0F614FAF3}" type="datetimeFigureOut">
               <a:rPr lang="de-DE" smtClean="0"/>
-              <a:t>20.09.2017</a:t>
+              <a:t>20.09.17</a:t>
             </a:fld>
             <a:endParaRPr lang="de-DE"/>
           </a:p>
@@ -3280,7 +3291,7 @@
           <a:p>
             <a:fld id="{802006FE-6571-4354-8775-F8708372C227}" type="slidenum">
               <a:rPr lang="de-DE" smtClean="0"/>
-              <a:t>‹Nr.›</a:t>
+              <a:t>‹#›</a:t>
             </a:fld>
             <a:endParaRPr lang="de-DE"/>
           </a:p>
@@ -3513,7 +3524,7 @@
           <a:p>
             <a:fld id="{D3EB3054-B75A-4BD7-8B3E-8DC0F614FAF3}" type="datetimeFigureOut">
               <a:rPr lang="de-DE" smtClean="0"/>
-              <a:t>20.09.2017</a:t>
+              <a:t>20.09.17</a:t>
             </a:fld>
             <a:endParaRPr lang="de-DE"/>
           </a:p>
@@ -3555,7 +3566,7 @@
           <a:p>
             <a:fld id="{802006FE-6571-4354-8775-F8708372C227}" type="slidenum">
               <a:rPr lang="de-DE" smtClean="0"/>
-              <a:t>‹Nr.›</a:t>
+              <a:t>‹#›</a:t>
             </a:fld>
             <a:endParaRPr lang="de-DE"/>
           </a:p>
@@ -3765,7 +3776,7 @@
           <a:p>
             <a:fld id="{D3EB3054-B75A-4BD7-8B3E-8DC0F614FAF3}" type="datetimeFigureOut">
               <a:rPr lang="de-DE" smtClean="0"/>
-              <a:t>20.09.2017</a:t>
+              <a:t>20.09.17</a:t>
             </a:fld>
             <a:endParaRPr lang="de-DE"/>
           </a:p>
@@ -3807,7 +3818,7 @@
           <a:p>
             <a:fld id="{802006FE-6571-4354-8775-F8708372C227}" type="slidenum">
               <a:rPr lang="de-DE" smtClean="0"/>
-              <a:t>‹Nr.›</a:t>
+              <a:t>‹#›</a:t>
             </a:fld>
             <a:endParaRPr lang="de-DE"/>
           </a:p>
@@ -3976,7 +3987,7 @@
           <a:p>
             <a:fld id="{D3EB3054-B75A-4BD7-8B3E-8DC0F614FAF3}" type="datetimeFigureOut">
               <a:rPr lang="de-DE" smtClean="0"/>
-              <a:t>20.09.2017</a:t>
+              <a:t>20.09.17</a:t>
             </a:fld>
             <a:endParaRPr lang="de-DE"/>
           </a:p>
@@ -4054,7 +4065,7 @@
           <a:p>
             <a:fld id="{802006FE-6571-4354-8775-F8708372C227}" type="slidenum">
               <a:rPr lang="de-DE" smtClean="0"/>
-              <a:t>‹Nr.›</a:t>
+              <a:t>‹#›</a:t>
             </a:fld>
             <a:endParaRPr lang="de-DE"/>
           </a:p>
@@ -4434,7 +4445,7 @@
           <p:cNvPr id="11" name="Freeform 3">
             <a:extLst>
               <a:ext uri="{FF2B5EF4-FFF2-40B4-BE49-F238E27FC236}">
-                <a16:creationId xmlns="" xmlns:a16="http://schemas.microsoft.com/office/drawing/2014/main" id="{F6429F11-64E2-4420-9B0C-F3F81BF0D15B}"/>
+                <a16:creationId xmlns:a16="http://schemas.microsoft.com/office/drawing/2014/main" xmlns="" id="{F6429F11-64E2-4420-9B0C-F3F81BF0D15B}"/>
               </a:ext>
             </a:extLst>
           </p:cNvPr>
@@ -4444,7 +4455,7 @@
           <p:nvPr>
             <p:extLst>
               <p:ext uri="{386F3935-93C4-4BCD-93E2-E3B085C9AB24}">
-                <p16:designElem xmlns="" xmlns:p16="http://schemas.microsoft.com/office/powerpoint/2015/main" val="1"/>
+                <p16:designElem xmlns:p16="http://schemas.microsoft.com/office/powerpoint/2015/main" val="1"/>
               </p:ext>
             </p:extLst>
           </p:nvPr>
@@ -4599,7 +4610,7 @@
           <p:cNvPr id="13" name="Freeform 4">
             <a:extLst>
               <a:ext uri="{FF2B5EF4-FFF2-40B4-BE49-F238E27FC236}">
-                <a16:creationId xmlns="" xmlns:a16="http://schemas.microsoft.com/office/drawing/2014/main" id="{62785A07-F203-435E-8E76-BB97680C2FCA}"/>
+                <a16:creationId xmlns:a16="http://schemas.microsoft.com/office/drawing/2014/main" xmlns="" id="{62785A07-F203-435E-8E76-BB97680C2FCA}"/>
               </a:ext>
             </a:extLst>
           </p:cNvPr>
@@ -4609,7 +4620,7 @@
           <p:nvPr>
             <p:extLst>
               <p:ext uri="{386F3935-93C4-4BCD-93E2-E3B085C9AB24}">
-                <p16:designElem xmlns="" xmlns:p16="http://schemas.microsoft.com/office/powerpoint/2015/main" val="1"/>
+                <p16:designElem xmlns:p16="http://schemas.microsoft.com/office/powerpoint/2015/main" val="1"/>
               </p:ext>
             </p:extLst>
           </p:nvPr>
@@ -4885,22 +4896,28 @@
       </p:grpSpPr>
       <p:pic>
         <p:nvPicPr>
-          <p:cNvPr id="4" name="Grafik 4" descr="Architektur.jpg"/>
+          <p:cNvPr id="2" name="Picture 1"/>
           <p:cNvPicPr>
             <a:picLocks noChangeAspect="1"/>
           </p:cNvPicPr>
           <p:nvPr/>
         </p:nvPicPr>
         <p:blipFill>
-          <a:blip r:embed="rId2"/>
+          <a:blip r:embed="rId2">
+            <a:extLst>
+              <a:ext uri="{28A0092B-C50C-407E-A947-70E740481C1C}">
+                <a14:useLocalDpi xmlns:a14="http://schemas.microsoft.com/office/drawing/2010/main" val="0"/>
+              </a:ext>
+            </a:extLst>
+          </a:blip>
           <a:stretch>
             <a:fillRect/>
           </a:stretch>
         </p:blipFill>
         <p:spPr>
           <a:xfrm>
-            <a:off x="687197" y="643466"/>
-            <a:ext cx="10817605" cy="5571067"/>
+            <a:off x="232032" y="347019"/>
+            <a:ext cx="11691563" cy="6016711"/>
           </a:xfrm>
           <a:prstGeom prst="rect">
             <a:avLst/>
@@ -4946,7 +4963,7 @@
           <p:nvPr>
             <p:extLst>
               <p:ext uri="{386F3935-93C4-4BCD-93E2-E3B085C9AB24}">
-                <p16:designElem xmlns="" xmlns:p16="http://schemas.microsoft.com/office/powerpoint/2015/main" val="1"/>
+                <p16:designElem xmlns:p16="http://schemas.microsoft.com/office/powerpoint/2015/main" val="1"/>
               </p:ext>
             </p:extLst>
           </p:nvPr>
@@ -4998,7 +5015,7 @@
           <p:cNvPr id="13" name="Rectangle 12">
             <a:extLst>
               <a:ext uri="{FF2B5EF4-FFF2-40B4-BE49-F238E27FC236}">
-                <a16:creationId xmlns="" xmlns:a16="http://schemas.microsoft.com/office/drawing/2014/main" id="{5FE860FF-6214-458C-B8B6-840D3D4BD8AE}"/>
+                <a16:creationId xmlns:a16="http://schemas.microsoft.com/office/drawing/2014/main" xmlns="" id="{5FE860FF-6214-458C-B8B6-840D3D4BD8AE}"/>
               </a:ext>
             </a:extLst>
           </p:cNvPr>
@@ -5008,7 +5025,7 @@
           <p:nvPr>
             <p:extLst>
               <p:ext uri="{386F3935-93C4-4BCD-93E2-E3B085C9AB24}">
-                <p16:designElem xmlns="" xmlns:p16="http://schemas.microsoft.com/office/powerpoint/2015/main" val="1"/>
+                <p16:designElem xmlns:p16="http://schemas.microsoft.com/office/powerpoint/2015/main" val="1"/>
               </p:ext>
             </p:extLst>
           </p:nvPr>
@@ -5061,7 +5078,7 @@
           <p:cNvPr id="15" name="Straight Connector 14">
             <a:extLst>
               <a:ext uri="{FF2B5EF4-FFF2-40B4-BE49-F238E27FC236}">
-                <a16:creationId xmlns="" xmlns:a16="http://schemas.microsoft.com/office/drawing/2014/main" id="{6079A69E-2DBC-4FA4-8495-9B37C56A910E}"/>
+                <a16:creationId xmlns:a16="http://schemas.microsoft.com/office/drawing/2014/main" xmlns="" id="{6079A69E-2DBC-4FA4-8495-9B37C56A910E}"/>
               </a:ext>
             </a:extLst>
           </p:cNvPr>
@@ -5071,7 +5088,7 @@
           <p:nvPr>
             <p:extLst>
               <p:ext uri="{386F3935-93C4-4BCD-93E2-E3B085C9AB24}">
-                <p16:designElem xmlns="" xmlns:p16="http://schemas.microsoft.com/office/powerpoint/2015/main" val="1"/>
+                <p16:designElem xmlns:p16="http://schemas.microsoft.com/office/powerpoint/2015/main" val="1"/>
               </p:ext>
             </p:extLst>
           </p:nvPr>
@@ -5112,7 +5129,7 @@
           <p:cNvPr id="17" name="Straight Connector 16">
             <a:extLst>
               <a:ext uri="{FF2B5EF4-FFF2-40B4-BE49-F238E27FC236}">
-                <a16:creationId xmlns="" xmlns:a16="http://schemas.microsoft.com/office/drawing/2014/main" id="{0F80B1E9-A8C1-4802-BFFD-7FC81CD2112C}"/>
+                <a16:creationId xmlns:a16="http://schemas.microsoft.com/office/drawing/2014/main" xmlns="" id="{0F80B1E9-A8C1-4802-BFFD-7FC81CD2112C}"/>
               </a:ext>
             </a:extLst>
           </p:cNvPr>
@@ -5122,7 +5139,7 @@
           <p:nvPr>
             <p:extLst>
               <p:ext uri="{386F3935-93C4-4BCD-93E2-E3B085C9AB24}">
-                <p16:designElem xmlns="" xmlns:p16="http://schemas.microsoft.com/office/powerpoint/2015/main" val="1"/>
+                <p16:designElem xmlns:p16="http://schemas.microsoft.com/office/powerpoint/2015/main" val="1"/>
               </p:ext>
             </p:extLst>
           </p:nvPr>
@@ -5227,7 +5244,7 @@
           <p:cNvPr id="38" name="Freeform 34">
             <a:extLst>
               <a:ext uri="{FF2B5EF4-FFF2-40B4-BE49-F238E27FC236}">
-                <a16:creationId xmlns="" xmlns:a16="http://schemas.microsoft.com/office/drawing/2014/main" id="{B0992639-1CDA-4FE6-BB95-E13221490740}"/>
+                <a16:creationId xmlns:a16="http://schemas.microsoft.com/office/drawing/2014/main" xmlns="" id="{B0992639-1CDA-4FE6-BB95-E13221490740}"/>
               </a:ext>
             </a:extLst>
           </p:cNvPr>
@@ -5237,7 +5254,7 @@
           <p:nvPr>
             <p:extLst>
               <p:ext uri="{386F3935-93C4-4BCD-93E2-E3B085C9AB24}">
-                <p16:designElem xmlns="" xmlns:p16="http://schemas.microsoft.com/office/powerpoint/2015/main" val="1"/>
+                <p16:designElem xmlns:p16="http://schemas.microsoft.com/office/powerpoint/2015/main" val="1"/>
               </p:ext>
             </p:extLst>
           </p:nvPr>
@@ -5350,7 +5367,7 @@
           <p:cNvPr id="40" name="Freeform 31">
             <a:extLst>
               <a:ext uri="{FF2B5EF4-FFF2-40B4-BE49-F238E27FC236}">
-                <a16:creationId xmlns="" xmlns:a16="http://schemas.microsoft.com/office/drawing/2014/main" id="{A2AEA782-0EA4-42E9-871D-7401D6A09739}"/>
+                <a16:creationId xmlns:a16="http://schemas.microsoft.com/office/drawing/2014/main" xmlns="" id="{A2AEA782-0EA4-42E9-871D-7401D6A09739}"/>
               </a:ext>
             </a:extLst>
           </p:cNvPr>
@@ -5360,7 +5377,7 @@
           <p:nvPr>
             <p:extLst>
               <p:ext uri="{386F3935-93C4-4BCD-93E2-E3B085C9AB24}">
-                <p16:designElem xmlns="" xmlns:p16="http://schemas.microsoft.com/office/powerpoint/2015/main" val="1"/>
+                <p16:designElem xmlns:p16="http://schemas.microsoft.com/office/powerpoint/2015/main" val="1"/>
               </p:ext>
             </p:extLst>
           </p:nvPr>
@@ -5774,7 +5791,7 @@
           <p:nvPr>
             <p:extLst>
               <p:ext uri="{386F3935-93C4-4BCD-93E2-E3B085C9AB24}">
-                <p16:designElem xmlns="" xmlns:p16="http://schemas.microsoft.com/office/powerpoint/2015/main" val="1"/>
+                <p16:designElem xmlns:p16="http://schemas.microsoft.com/office/powerpoint/2015/main" val="1"/>
               </p:ext>
             </p:extLst>
           </p:nvPr>
@@ -5827,7 +5844,7 @@
           <p:cNvPr id="17" name="Down Arrow 7">
             <a:extLst>
               <a:ext uri="{FF2B5EF4-FFF2-40B4-BE49-F238E27FC236}">
-                <a16:creationId xmlns="" xmlns:a16="http://schemas.microsoft.com/office/drawing/2014/main" id="{D4771268-CB57-404A-9271-370EB28F6090}"/>
+                <a16:creationId xmlns:a16="http://schemas.microsoft.com/office/drawing/2014/main" xmlns="" id="{D4771268-CB57-404A-9271-370EB28F6090}"/>
               </a:ext>
             </a:extLst>
           </p:cNvPr>
@@ -5837,7 +5854,7 @@
           <p:nvPr>
             <p:extLst>
               <p:ext uri="{386F3935-93C4-4BCD-93E2-E3B085C9AB24}">
-                <p16:designElem xmlns="" xmlns:p16="http://schemas.microsoft.com/office/powerpoint/2015/main" val="1"/>
+                <p16:designElem xmlns:p16="http://schemas.microsoft.com/office/powerpoint/2015/main" val="1"/>
               </p:ext>
             </p:extLst>
           </p:nvPr>
@@ -5970,7 +5987,7 @@
           <p:nvPr>
             <p:extLst>
               <p:ext uri="{386F3935-93C4-4BCD-93E2-E3B085C9AB24}">
-                <p16:designElem xmlns="" xmlns:p16="http://schemas.microsoft.com/office/powerpoint/2015/main" val="1"/>
+                <p16:designElem xmlns:p16="http://schemas.microsoft.com/office/powerpoint/2015/main" val="1"/>
               </p:ext>
             </p:extLst>
           </p:nvPr>
@@ -6023,7 +6040,7 @@
           <p:cNvPr id="17" name="Down Arrow 7">
             <a:extLst>
               <a:ext uri="{FF2B5EF4-FFF2-40B4-BE49-F238E27FC236}">
-                <a16:creationId xmlns="" xmlns:a16="http://schemas.microsoft.com/office/drawing/2014/main" id="{D4771268-CB57-404A-9271-370EB28F6090}"/>
+                <a16:creationId xmlns:a16="http://schemas.microsoft.com/office/drawing/2014/main" xmlns="" id="{D4771268-CB57-404A-9271-370EB28F6090}"/>
               </a:ext>
             </a:extLst>
           </p:cNvPr>
@@ -6033,7 +6050,7 @@
           <p:nvPr>
             <p:extLst>
               <p:ext uri="{386F3935-93C4-4BCD-93E2-E3B085C9AB24}">
-                <p16:designElem xmlns="" xmlns:p16="http://schemas.microsoft.com/office/powerpoint/2015/main" val="1"/>
+                <p16:designElem xmlns:p16="http://schemas.microsoft.com/office/powerpoint/2015/main" val="1"/>
               </p:ext>
             </p:extLst>
           </p:nvPr>
@@ -6166,7 +6183,7 @@
           <p:nvPr>
             <p:extLst>
               <p:ext uri="{386F3935-93C4-4BCD-93E2-E3B085C9AB24}">
-                <p16:designElem xmlns="" xmlns:p16="http://schemas.microsoft.com/office/powerpoint/2015/main" val="1"/>
+                <p16:designElem xmlns:p16="http://schemas.microsoft.com/office/powerpoint/2015/main" val="1"/>
               </p:ext>
             </p:extLst>
           </p:nvPr>
@@ -6219,7 +6236,7 @@
           <p:cNvPr id="24" name="Down Arrow 7">
             <a:extLst>
               <a:ext uri="{FF2B5EF4-FFF2-40B4-BE49-F238E27FC236}">
-                <a16:creationId xmlns="" xmlns:a16="http://schemas.microsoft.com/office/drawing/2014/main" id="{D4771268-CB57-404A-9271-370EB28F6090}"/>
+                <a16:creationId xmlns:a16="http://schemas.microsoft.com/office/drawing/2014/main" xmlns="" id="{D4771268-CB57-404A-9271-370EB28F6090}"/>
               </a:ext>
             </a:extLst>
           </p:cNvPr>
@@ -6229,7 +6246,7 @@
           <p:nvPr>
             <p:extLst>
               <p:ext uri="{386F3935-93C4-4BCD-93E2-E3B085C9AB24}">
-                <p16:designElem xmlns="" xmlns:p16="http://schemas.microsoft.com/office/powerpoint/2015/main" val="1"/>
+                <p16:designElem xmlns:p16="http://schemas.microsoft.com/office/powerpoint/2015/main" val="1"/>
               </p:ext>
             </p:extLst>
           </p:nvPr>
@@ -6354,7 +6371,7 @@
           <p:nvPr>
             <p:extLst>
               <p:ext uri="{386F3935-93C4-4BCD-93E2-E3B085C9AB24}">
-                <p16:designElem xmlns="" xmlns:p16="http://schemas.microsoft.com/office/powerpoint/2015/main" val="1"/>
+                <p16:designElem xmlns:p16="http://schemas.microsoft.com/office/powerpoint/2015/main" val="1"/>
               </p:ext>
             </p:extLst>
           </p:nvPr>
@@ -6407,7 +6424,7 @@
           <p:cNvPr id="24" name="Down Arrow 7">
             <a:extLst>
               <a:ext uri="{FF2B5EF4-FFF2-40B4-BE49-F238E27FC236}">
-                <a16:creationId xmlns="" xmlns:a16="http://schemas.microsoft.com/office/drawing/2014/main" id="{D4771268-CB57-404A-9271-370EB28F6090}"/>
+                <a16:creationId xmlns:a16="http://schemas.microsoft.com/office/drawing/2014/main" xmlns="" id="{D4771268-CB57-404A-9271-370EB28F6090}"/>
               </a:ext>
             </a:extLst>
           </p:cNvPr>
@@ -6417,7 +6434,7 @@
           <p:nvPr>
             <p:extLst>
               <p:ext uri="{386F3935-93C4-4BCD-93E2-E3B085C9AB24}">
-                <p16:designElem xmlns="" xmlns:p16="http://schemas.microsoft.com/office/powerpoint/2015/main" val="1"/>
+                <p16:designElem xmlns:p16="http://schemas.microsoft.com/office/powerpoint/2015/main" val="1"/>
               </p:ext>
             </p:extLst>
           </p:nvPr>
@@ -6542,7 +6559,7 @@
           <p:nvPr>
             <p:extLst>
               <p:ext uri="{386F3935-93C4-4BCD-93E2-E3B085C9AB24}">
-                <p16:designElem xmlns="" xmlns:p16="http://schemas.microsoft.com/office/powerpoint/2015/main" val="1"/>
+                <p16:designElem xmlns:p16="http://schemas.microsoft.com/office/powerpoint/2015/main" val="1"/>
               </p:ext>
             </p:extLst>
           </p:nvPr>
@@ -6595,7 +6612,7 @@
           <p:cNvPr id="31" name="Down Arrow 7">
             <a:extLst>
               <a:ext uri="{FF2B5EF4-FFF2-40B4-BE49-F238E27FC236}">
-                <a16:creationId xmlns="" xmlns:a16="http://schemas.microsoft.com/office/drawing/2014/main" id="{D4771268-CB57-404A-9271-370EB28F6090}"/>
+                <a16:creationId xmlns:a16="http://schemas.microsoft.com/office/drawing/2014/main" xmlns="" id="{D4771268-CB57-404A-9271-370EB28F6090}"/>
               </a:ext>
             </a:extLst>
           </p:cNvPr>
@@ -6605,7 +6622,7 @@
           <p:nvPr>
             <p:extLst>
               <p:ext uri="{386F3935-93C4-4BCD-93E2-E3B085C9AB24}">
-                <p16:designElem xmlns="" xmlns:p16="http://schemas.microsoft.com/office/powerpoint/2015/main" val="1"/>
+                <p16:designElem xmlns:p16="http://schemas.microsoft.com/office/powerpoint/2015/main" val="1"/>
               </p:ext>
             </p:extLst>
           </p:nvPr>
@@ -7360,7 +7377,7 @@
   <a:extraClrSchemeLst/>
   <a:extLst>
     <a:ext uri="{05A4C25C-085E-4340-85A3-A5531E510DB2}">
-      <thm15:themeFamily xmlns="" xmlns:thm15="http://schemas.microsoft.com/office/thememl/2012/main" name="Office Theme" id="{62F939B6-93AF-4DB8-9C6B-D6C7DFDC589F}" vid="{4A3C46E8-61CC-4603-A589-7422A47A8E4A}"/>
+      <thm15:themeFamily xmlns:thm15="http://schemas.microsoft.com/office/thememl/2012/main" name="Office Theme" id="{62F939B6-93AF-4DB8-9C6B-D6C7DFDC589F}" vid="{4A3C46E8-61CC-4603-A589-7422A47A8E4A}"/>
     </a:ext>
   </a:extLst>
 </a:theme>
@@ -7655,7 +7672,7 @@
   <a:extraClrSchemeLst/>
   <a:extLst>
     <a:ext uri="{05A4C25C-085E-4340-85A3-A5531E510DB2}">
-      <thm15:themeFamily xmlns="" xmlns:thm15="http://schemas.microsoft.com/office/thememl/2012/main" name="Office Theme" id="{62F939B6-93AF-4DB8-9C6B-D6C7DFDC589F}" vid="{4A3C46E8-61CC-4603-A589-7422A47A8E4A}"/>
+      <thm15:themeFamily xmlns:thm15="http://schemas.microsoft.com/office/thememl/2012/main" name="Office Theme" id="{62F939B6-93AF-4DB8-9C6B-D6C7DFDC589F}" vid="{4A3C46E8-61CC-4603-A589-7422A47A8E4A}"/>
     </a:ext>
   </a:extLst>
 </a:theme>

</xml_diff>